<commit_message>
Added support for scaled images
</commit_message>
<xml_diff>
--- a/assets/TitleCard/TitleCard.pptx
+++ b/assets/TitleCard/TitleCard.pptx
@@ -105,6 +105,11 @@
       </a:defRPr>
     </a:lvl9pPr>
   </p:defaultTextStyle>
+  <p:extLst>
+    <p:ext uri="{EFAFB233-063F-42B5-8137-9DF3F51BA10A}">
+      <p15:sldGuideLst xmlns:p15="http://schemas.microsoft.com/office/powerpoint/2012/main"/>
+    </p:ext>
+  </p:extLst>
 </p:presentation>
 </file>
 
@@ -3515,10 +3520,10 @@
       </p:grpSpPr>
       <p:pic>
         <p:nvPicPr>
-          <p:cNvPr id="5" name="Picture 4">
-            <a:extLst>
-              <a:ext uri="{FF2B5EF4-FFF2-40B4-BE49-F238E27FC236}">
-                <a16:creationId xmlns:a16="http://schemas.microsoft.com/office/drawing/2014/main" id="{3A1EB66F-0CCC-4853-97FD-F7DA848F4A9E}"/>
+          <p:cNvPr id="2" name="Picture 1">
+            <a:extLst>
+              <a:ext uri="{FF2B5EF4-FFF2-40B4-BE49-F238E27FC236}">
+                <a16:creationId xmlns:a16="http://schemas.microsoft.com/office/drawing/2014/main" id="{F55D2DD5-43D8-4923-A880-A09F01E33DF8}"/>
               </a:ext>
             </a:extLst>
           </p:cNvPr>

</xml_diff>